<commit_message>
context attribute event order
</commit_message>
<xml_diff>
--- a/resource/docs/ServicePlatformAradon.pptx
+++ b/resource/docs/ServicePlatformAradon.pptx
@@ -6306,7 +6306,7 @@
                 <a:latin typeface="나눔고딕" pitchFamily="50" charset="-127"/>
                 <a:ea typeface="나눔고딕" pitchFamily="50" charset="-127"/>
               </a:rPr>
-              <a:t>Aradon</a:t>
+              <a:t>AradonNode</a:t>
             </a:r>
             <a:endParaRPr lang="en-US" altLang="ko-KR" sz="2000" dirty="0" smtClean="0">
               <a:solidFill>
@@ -6561,7 +6561,7 @@
                 <a:latin typeface="나눔고딕" pitchFamily="50" charset="-127"/>
                 <a:ea typeface="나눔고딕" pitchFamily="50" charset="-127"/>
               </a:rPr>
-              <a:t>Aradon</a:t>
+              <a:t>AradonNode</a:t>
             </a:r>
             <a:endParaRPr lang="en-US" altLang="ko-KR" sz="2000" dirty="0" smtClean="0">
               <a:solidFill>
@@ -6656,7 +6656,7 @@
                 <a:latin typeface="나눔고딕" pitchFamily="50" charset="-127"/>
                 <a:ea typeface="나눔고딕" pitchFamily="50" charset="-127"/>
               </a:rPr>
-              <a:t>Aradon</a:t>
+              <a:t>AradonNode</a:t>
             </a:r>
             <a:endParaRPr lang="en-US" altLang="ko-KR" sz="2000" dirty="0" smtClean="0">
               <a:solidFill>

</xml_diff>